<commit_message>
dodano zadržavanje korijena riječi
</commit_message>
<xml_diff>
--- a/UZOP_prezentacija.pptx
+++ b/UZOP_prezentacija.pptx
@@ -7,11 +7,14 @@
   <p:sldIdLst>
     <p:sldId id="256" r:id="rId2"/>
     <p:sldId id="257" r:id="rId3"/>
-    <p:sldId id="258" r:id="rId4"/>
-    <p:sldId id="259" r:id="rId5"/>
-    <p:sldId id="260" r:id="rId6"/>
-    <p:sldId id="261" r:id="rId7"/>
-    <p:sldId id="262" r:id="rId8"/>
+    <p:sldId id="263" r:id="rId4"/>
+    <p:sldId id="258" r:id="rId5"/>
+    <p:sldId id="259" r:id="rId6"/>
+    <p:sldId id="260" r:id="rId7"/>
+    <p:sldId id="264" r:id="rId8"/>
+    <p:sldId id="266" r:id="rId9"/>
+    <p:sldId id="261" r:id="rId10"/>
+    <p:sldId id="262" r:id="rId11"/>
   </p:sldIdLst>
   <p:sldSz cx="12192000" cy="6858000"/>
   <p:notesSz cx="6858000" cy="9144000"/>
@@ -6195,6 +6198,90 @@
 </p:sld>
 </file>
 
+<file path=ppt/slides/slide10.xml><?xml version="1.0" encoding="utf-8"?>
+<p:sld xmlns:a="http://schemas.openxmlformats.org/drawingml/2006/main" xmlns:r="http://schemas.openxmlformats.org/officeDocument/2006/relationships" xmlns:p="http://schemas.openxmlformats.org/presentationml/2006/main">
+  <p:cSld>
+    <p:spTree>
+      <p:nvGrpSpPr>
+        <p:cNvPr id="1" name=""/>
+        <p:cNvGrpSpPr/>
+        <p:nvPr/>
+      </p:nvGrpSpPr>
+      <p:grpSpPr>
+        <a:xfrm>
+          <a:off x="0" y="0"/>
+          <a:ext cx="0" cy="0"/>
+          <a:chOff x="0" y="0"/>
+          <a:chExt cx="0" cy="0"/>
+        </a:xfrm>
+      </p:grpSpPr>
+      <p:sp>
+        <p:nvSpPr>
+          <p:cNvPr id="2" name="Title 1">
+            <a:extLst>
+              <a:ext uri="{FF2B5EF4-FFF2-40B4-BE49-F238E27FC236}">
+                <a16:creationId xmlns:a16="http://schemas.microsoft.com/office/drawing/2014/main" id="{3B7A3E26-276A-3C77-9F09-48B55DF68F66}"/>
+              </a:ext>
+            </a:extLst>
+          </p:cNvPr>
+          <p:cNvSpPr>
+            <a:spLocks noGrp="1"/>
+          </p:cNvSpPr>
+          <p:nvPr>
+            <p:ph type="title"/>
+          </p:nvPr>
+        </p:nvSpPr>
+        <p:spPr/>
+        <p:txBody>
+          <a:bodyPr/>
+          <a:lstStyle/>
+          <a:p>
+            <a:r>
+              <a:rPr lang="hr-HR" dirty="0"/>
+              <a:t>3) REGULARIZACIJA</a:t>
+            </a:r>
+            <a:endParaRPr lang="en-US" dirty="0"/>
+          </a:p>
+        </p:txBody>
+      </p:sp>
+      <p:sp>
+        <p:nvSpPr>
+          <p:cNvPr id="3" name="Content Placeholder 2">
+            <a:extLst>
+              <a:ext uri="{FF2B5EF4-FFF2-40B4-BE49-F238E27FC236}">
+                <a16:creationId xmlns:a16="http://schemas.microsoft.com/office/drawing/2014/main" id="{73731AEF-8FE9-4FBA-D09D-37FBC67444DD}"/>
+              </a:ext>
+            </a:extLst>
+          </p:cNvPr>
+          <p:cNvSpPr>
+            <a:spLocks noGrp="1"/>
+          </p:cNvSpPr>
+          <p:nvPr>
+            <p:ph idx="1"/>
+          </p:nvPr>
+        </p:nvSpPr>
+        <p:spPr/>
+        <p:txBody>
+          <a:bodyPr/>
+          <a:lstStyle/>
+          <a:p>
+            <a:endParaRPr lang="en-US"/>
+          </a:p>
+        </p:txBody>
+      </p:sp>
+    </p:spTree>
+    <p:extLst>
+      <p:ext uri="{BB962C8B-B14F-4D97-AF65-F5344CB8AC3E}">
+        <p14:creationId xmlns:p14="http://schemas.microsoft.com/office/powerpoint/2010/main" val="478732706"/>
+      </p:ext>
+    </p:extLst>
+  </p:cSld>
+  <p:clrMapOvr>
+    <a:masterClrMapping/>
+  </p:clrMapOvr>
+</p:sld>
+</file>
+
 <file path=ppt/slides/slide2.xml><?xml version="1.0" encoding="utf-8"?>
 <p:sld xmlns:a="http://schemas.openxmlformats.org/drawingml/2006/main" xmlns:r="http://schemas.openxmlformats.org/officeDocument/2006/relationships" xmlns:p="http://schemas.openxmlformats.org/presentationml/2006/main">
   <p:cSld>
@@ -6345,6 +6432,425 @@
 </file>
 
 <file path=ppt/slides/slide3.xml><?xml version="1.0" encoding="utf-8"?>
+<p:sld xmlns:a="http://schemas.openxmlformats.org/drawingml/2006/main" xmlns:r="http://schemas.openxmlformats.org/officeDocument/2006/relationships" xmlns:p="http://schemas.openxmlformats.org/presentationml/2006/main">
+  <p:cSld>
+    <p:spTree>
+      <p:nvGrpSpPr>
+        <p:cNvPr id="1" name=""/>
+        <p:cNvGrpSpPr/>
+        <p:nvPr/>
+      </p:nvGrpSpPr>
+      <p:grpSpPr>
+        <a:xfrm>
+          <a:off x="0" y="0"/>
+          <a:ext cx="0" cy="0"/>
+          <a:chOff x="0" y="0"/>
+          <a:chExt cx="0" cy="0"/>
+        </a:xfrm>
+      </p:grpSpPr>
+      <p:sp>
+        <p:nvSpPr>
+          <p:cNvPr id="2" name="Title 1">
+            <a:extLst>
+              <a:ext uri="{FF2B5EF4-FFF2-40B4-BE49-F238E27FC236}">
+                <a16:creationId xmlns:a16="http://schemas.microsoft.com/office/drawing/2014/main" id="{90CCEB10-57F5-2F8C-EDAE-84E20B399D71}"/>
+              </a:ext>
+            </a:extLst>
+          </p:cNvPr>
+          <p:cNvSpPr>
+            <a:spLocks noGrp="1"/>
+          </p:cNvSpPr>
+          <p:nvPr>
+            <p:ph type="title"/>
+          </p:nvPr>
+        </p:nvSpPr>
+        <p:spPr/>
+        <p:txBody>
+          <a:bodyPr/>
+          <a:lstStyle/>
+          <a:p>
+            <a:r>
+              <a:rPr lang="hr-HR" dirty="0"/>
+              <a:t>PRIPREMA PODATAKA</a:t>
+            </a:r>
+            <a:endParaRPr lang="en-US" dirty="0"/>
+          </a:p>
+        </p:txBody>
+      </p:sp>
+      <p:sp>
+        <p:nvSpPr>
+          <p:cNvPr id="3" name="Content Placeholder 2">
+            <a:extLst>
+              <a:ext uri="{FF2B5EF4-FFF2-40B4-BE49-F238E27FC236}">
+                <a16:creationId xmlns:a16="http://schemas.microsoft.com/office/drawing/2014/main" id="{DF268DB0-6EEC-6E0C-79CD-02EC60677354}"/>
+              </a:ext>
+            </a:extLst>
+          </p:cNvPr>
+          <p:cNvSpPr>
+            <a:spLocks noGrp="1"/>
+          </p:cNvSpPr>
+          <p:nvPr>
+            <p:ph idx="1"/>
+          </p:nvPr>
+        </p:nvSpPr>
+        <p:spPr/>
+        <p:txBody>
+          <a:bodyPr/>
+          <a:lstStyle/>
+          <a:p>
+            <a:r>
+              <a:rPr lang="hr-HR" dirty="0"/>
+              <a:t>Pretvaranje svih velikih slova u mala</a:t>
+            </a:r>
+          </a:p>
+          <a:p>
+            <a:r>
+              <a:rPr lang="hr-HR" dirty="0"/>
+              <a:t>Uklanjanje interpunkcijskih znakova</a:t>
+            </a:r>
+          </a:p>
+          <a:p>
+            <a:r>
+              <a:rPr lang="hr-HR" dirty="0"/>
+              <a:t>Uklanjanje </a:t>
+            </a:r>
+            <a:r>
+              <a:rPr lang="hr-HR" dirty="0" err="1"/>
+              <a:t>stopwords</a:t>
+            </a:r>
+            <a:endParaRPr lang="hr-HR" dirty="0"/>
+          </a:p>
+          <a:p>
+            <a:r>
+              <a:rPr lang="hr-HR" dirty="0"/>
+              <a:t>Odabir članaka s potrebnim temama</a:t>
+            </a:r>
+          </a:p>
+          <a:p>
+            <a:r>
+              <a:rPr lang="hr-HR" dirty="0"/>
+              <a:t>Podjela članaka u skupove za treniranje i ispitivanje</a:t>
+            </a:r>
+            <a:endParaRPr lang="en-US" dirty="0"/>
+          </a:p>
+        </p:txBody>
+      </p:sp>
+      <p:graphicFrame>
+        <p:nvGraphicFramePr>
+          <p:cNvPr id="4" name="Table 4">
+            <a:extLst>
+              <a:ext uri="{FF2B5EF4-FFF2-40B4-BE49-F238E27FC236}">
+                <a16:creationId xmlns:a16="http://schemas.microsoft.com/office/drawing/2014/main" id="{5367DB46-77B6-7C12-8FED-819BCAD6FB26}"/>
+              </a:ext>
+            </a:extLst>
+          </p:cNvPr>
+          <p:cNvGraphicFramePr>
+            <a:graphicFrameLocks noGrp="1"/>
+          </p:cNvGraphicFramePr>
+          <p:nvPr>
+            <p:extLst>
+              <p:ext uri="{D42A27DB-BD31-4B8C-83A1-F6EECF244321}">
+                <p14:modId xmlns:p14="http://schemas.microsoft.com/office/powerpoint/2010/main" val="451908375"/>
+              </p:ext>
+            </p:extLst>
+          </p:nvPr>
+        </p:nvGraphicFramePr>
+        <p:xfrm>
+          <a:off x="911668" y="4417351"/>
+          <a:ext cx="8127999" cy="1854200"/>
+        </p:xfrm>
+        <a:graphic>
+          <a:graphicData uri="http://schemas.openxmlformats.org/drawingml/2006/table">
+            <a:tbl>
+              <a:tblPr firstRow="1" bandRow="1">
+                <a:tableStyleId>{5C22544A-7EE6-4342-B048-85BDC9FD1C3A}</a:tableStyleId>
+              </a:tblPr>
+              <a:tblGrid>
+                <a:gridCol w="2709333">
+                  <a:extLst>
+                    <a:ext uri="{9D8B030D-6E8A-4147-A177-3AD203B41FA5}">
+                      <a16:colId xmlns:a16="http://schemas.microsoft.com/office/drawing/2014/main" val="1298999442"/>
+                    </a:ext>
+                  </a:extLst>
+                </a:gridCol>
+                <a:gridCol w="2709333">
+                  <a:extLst>
+                    <a:ext uri="{9D8B030D-6E8A-4147-A177-3AD203B41FA5}">
+                      <a16:colId xmlns:a16="http://schemas.microsoft.com/office/drawing/2014/main" val="2536166045"/>
+                    </a:ext>
+                  </a:extLst>
+                </a:gridCol>
+                <a:gridCol w="2709333">
+                  <a:extLst>
+                    <a:ext uri="{9D8B030D-6E8A-4147-A177-3AD203B41FA5}">
+                      <a16:colId xmlns:a16="http://schemas.microsoft.com/office/drawing/2014/main" val="4135257845"/>
+                    </a:ext>
+                  </a:extLst>
+                </a:gridCol>
+              </a:tblGrid>
+              <a:tr h="370840">
+                <a:tc>
+                  <a:txBody>
+                    <a:bodyPr/>
+                    <a:lstStyle/>
+                    <a:p>
+                      <a:r>
+                        <a:rPr lang="hr-HR" dirty="0"/>
+                        <a:t>TEMA</a:t>
+                      </a:r>
+                      <a:endParaRPr lang="en-US" dirty="0"/>
+                    </a:p>
+                  </a:txBody>
+                  <a:tcPr/>
+                </a:tc>
+                <a:tc>
+                  <a:txBody>
+                    <a:bodyPr/>
+                    <a:lstStyle/>
+                    <a:p>
+                      <a:r>
+                        <a:rPr lang="hr-HR" dirty="0"/>
+                        <a:t>BR. U TRAIN SETU</a:t>
+                      </a:r>
+                      <a:endParaRPr lang="en-US" dirty="0"/>
+                    </a:p>
+                  </a:txBody>
+                  <a:tcPr/>
+                </a:tc>
+                <a:tc>
+                  <a:txBody>
+                    <a:bodyPr/>
+                    <a:lstStyle/>
+                    <a:p>
+                      <a:r>
+                        <a:rPr lang="hr-HR" dirty="0"/>
+                        <a:t>BR. U TEST SETU</a:t>
+                      </a:r>
+                      <a:endParaRPr lang="en-US" dirty="0"/>
+                    </a:p>
+                  </a:txBody>
+                  <a:tcPr/>
+                </a:tc>
+                <a:extLst>
+                  <a:ext uri="{0D108BD9-81ED-4DB2-BD59-A6C34878D82A}">
+                    <a16:rowId xmlns:a16="http://schemas.microsoft.com/office/drawing/2014/main" val="2064658139"/>
+                  </a:ext>
+                </a:extLst>
+              </a:tr>
+              <a:tr h="370840">
+                <a:tc>
+                  <a:txBody>
+                    <a:bodyPr/>
+                    <a:lstStyle/>
+                    <a:p>
+                      <a:r>
+                        <a:rPr lang="hr-HR" dirty="0" err="1"/>
+                        <a:t>earn</a:t>
+                      </a:r>
+                      <a:endParaRPr lang="en-US" dirty="0"/>
+                    </a:p>
+                  </a:txBody>
+                  <a:tcPr/>
+                </a:tc>
+                <a:tc>
+                  <a:txBody>
+                    <a:bodyPr/>
+                    <a:lstStyle/>
+                    <a:p>
+                      <a:r>
+                        <a:rPr lang="hr-HR" dirty="0"/>
+                        <a:t>152</a:t>
+                      </a:r>
+                      <a:endParaRPr lang="en-US" dirty="0"/>
+                    </a:p>
+                  </a:txBody>
+                  <a:tcPr/>
+                </a:tc>
+                <a:tc>
+                  <a:txBody>
+                    <a:bodyPr/>
+                    <a:lstStyle/>
+                    <a:p>
+                      <a:r>
+                        <a:rPr lang="hr-HR" dirty="0"/>
+                        <a:t>40</a:t>
+                      </a:r>
+                      <a:endParaRPr lang="en-US" dirty="0"/>
+                    </a:p>
+                  </a:txBody>
+                  <a:tcPr/>
+                </a:tc>
+                <a:extLst>
+                  <a:ext uri="{0D108BD9-81ED-4DB2-BD59-A6C34878D82A}">
+                    <a16:rowId xmlns:a16="http://schemas.microsoft.com/office/drawing/2014/main" val="2292851606"/>
+                  </a:ext>
+                </a:extLst>
+              </a:tr>
+              <a:tr h="370840">
+                <a:tc>
+                  <a:txBody>
+                    <a:bodyPr/>
+                    <a:lstStyle/>
+                    <a:p>
+                      <a:r>
+                        <a:rPr lang="hr-HR" dirty="0" err="1"/>
+                        <a:t>acq</a:t>
+                      </a:r>
+                      <a:endParaRPr lang="en-US" dirty="0"/>
+                    </a:p>
+                  </a:txBody>
+                  <a:tcPr/>
+                </a:tc>
+                <a:tc>
+                  <a:txBody>
+                    <a:bodyPr/>
+                    <a:lstStyle/>
+                    <a:p>
+                      <a:r>
+                        <a:rPr lang="hr-HR" dirty="0"/>
+                        <a:t>114</a:t>
+                      </a:r>
+                      <a:endParaRPr lang="en-US" dirty="0"/>
+                    </a:p>
+                  </a:txBody>
+                  <a:tcPr/>
+                </a:tc>
+                <a:tc>
+                  <a:txBody>
+                    <a:bodyPr/>
+                    <a:lstStyle/>
+                    <a:p>
+                      <a:r>
+                        <a:rPr lang="hr-HR" dirty="0"/>
+                        <a:t>25</a:t>
+                      </a:r>
+                      <a:endParaRPr lang="en-US" dirty="0"/>
+                    </a:p>
+                  </a:txBody>
+                  <a:tcPr/>
+                </a:tc>
+                <a:extLst>
+                  <a:ext uri="{0D108BD9-81ED-4DB2-BD59-A6C34878D82A}">
+                    <a16:rowId xmlns:a16="http://schemas.microsoft.com/office/drawing/2014/main" val="1549253561"/>
+                  </a:ext>
+                </a:extLst>
+              </a:tr>
+              <a:tr h="370840">
+                <a:tc>
+                  <a:txBody>
+                    <a:bodyPr/>
+                    <a:lstStyle/>
+                    <a:p>
+                      <a:r>
+                        <a:rPr lang="hr-HR" dirty="0" err="1"/>
+                        <a:t>crude</a:t>
+                      </a:r>
+                      <a:endParaRPr lang="en-US" dirty="0"/>
+                    </a:p>
+                  </a:txBody>
+                  <a:tcPr/>
+                </a:tc>
+                <a:tc>
+                  <a:txBody>
+                    <a:bodyPr/>
+                    <a:lstStyle/>
+                    <a:p>
+                      <a:r>
+                        <a:rPr lang="hr-HR" dirty="0"/>
+                        <a:t>76</a:t>
+                      </a:r>
+                      <a:endParaRPr lang="en-US" dirty="0"/>
+                    </a:p>
+                  </a:txBody>
+                  <a:tcPr/>
+                </a:tc>
+                <a:tc>
+                  <a:txBody>
+                    <a:bodyPr/>
+                    <a:lstStyle/>
+                    <a:p>
+                      <a:r>
+                        <a:rPr lang="hr-HR" dirty="0"/>
+                        <a:t>15</a:t>
+                      </a:r>
+                      <a:endParaRPr lang="en-US" dirty="0"/>
+                    </a:p>
+                  </a:txBody>
+                  <a:tcPr/>
+                </a:tc>
+                <a:extLst>
+                  <a:ext uri="{0D108BD9-81ED-4DB2-BD59-A6C34878D82A}">
+                    <a16:rowId xmlns:a16="http://schemas.microsoft.com/office/drawing/2014/main" val="1294362620"/>
+                  </a:ext>
+                </a:extLst>
+              </a:tr>
+              <a:tr h="370840">
+                <a:tc>
+                  <a:txBody>
+                    <a:bodyPr/>
+                    <a:lstStyle/>
+                    <a:p>
+                      <a:r>
+                        <a:rPr lang="hr-HR" dirty="0" err="1"/>
+                        <a:t>corn</a:t>
+                      </a:r>
+                      <a:endParaRPr lang="en-US" dirty="0"/>
+                    </a:p>
+                  </a:txBody>
+                  <a:tcPr/>
+                </a:tc>
+                <a:tc>
+                  <a:txBody>
+                    <a:bodyPr/>
+                    <a:lstStyle/>
+                    <a:p>
+                      <a:r>
+                        <a:rPr lang="hr-HR" dirty="0"/>
+                        <a:t>38</a:t>
+                      </a:r>
+                      <a:endParaRPr lang="en-US" dirty="0"/>
+                    </a:p>
+                  </a:txBody>
+                  <a:tcPr/>
+                </a:tc>
+                <a:tc>
+                  <a:txBody>
+                    <a:bodyPr/>
+                    <a:lstStyle/>
+                    <a:p>
+                      <a:r>
+                        <a:rPr lang="hr-HR" dirty="0"/>
+                        <a:t>10</a:t>
+                      </a:r>
+                      <a:endParaRPr lang="en-US" dirty="0"/>
+                    </a:p>
+                  </a:txBody>
+                  <a:tcPr/>
+                </a:tc>
+                <a:extLst>
+                  <a:ext uri="{0D108BD9-81ED-4DB2-BD59-A6C34878D82A}">
+                    <a16:rowId xmlns:a16="http://schemas.microsoft.com/office/drawing/2014/main" val="2558906951"/>
+                  </a:ext>
+                </a:extLst>
+              </a:tr>
+            </a:tbl>
+          </a:graphicData>
+        </a:graphic>
+      </p:graphicFrame>
+    </p:spTree>
+    <p:extLst>
+      <p:ext uri="{BB962C8B-B14F-4D97-AF65-F5344CB8AC3E}">
+        <p14:creationId xmlns:p14="http://schemas.microsoft.com/office/powerpoint/2010/main" val="1174515520"/>
+      </p:ext>
+    </p:extLst>
+  </p:cSld>
+  <p:clrMapOvr>
+    <a:masterClrMapping/>
+  </p:clrMapOvr>
+</p:sld>
+</file>
+
+<file path=ppt/slides/slide4.xml><?xml version="1.0" encoding="utf-8"?>
 <p:sld xmlns:a="http://schemas.openxmlformats.org/drawingml/2006/main" xmlns:r="http://schemas.openxmlformats.org/officeDocument/2006/relationships" xmlns:p="http://schemas.openxmlformats.org/presentationml/2006/main">
   <p:cSld>
     <p:bg>
@@ -6399,7 +6905,7 @@
           <a:p>
             <a:r>
               <a:rPr lang="hr-HR" dirty="0"/>
-              <a:t>REPLICIRANJE REZULTATA</a:t>
+              <a:t>REPLIKACIJA REZULTATA</a:t>
             </a:r>
             <a:endParaRPr lang="en-US" dirty="0"/>
           </a:p>
@@ -6490,124 +6996,6 @@
 </p:sld>
 </file>
 
-<file path=ppt/slides/slide4.xml><?xml version="1.0" encoding="utf-8"?>
-<p:sld xmlns:a="http://schemas.openxmlformats.org/drawingml/2006/main" xmlns:r="http://schemas.openxmlformats.org/officeDocument/2006/relationships" xmlns:p="http://schemas.openxmlformats.org/presentationml/2006/main">
-  <p:cSld>
-    <p:spTree>
-      <p:nvGrpSpPr>
-        <p:cNvPr id="1" name=""/>
-        <p:cNvGrpSpPr/>
-        <p:nvPr/>
-      </p:nvGrpSpPr>
-      <p:grpSpPr>
-        <a:xfrm>
-          <a:off x="0" y="0"/>
-          <a:ext cx="0" cy="0"/>
-          <a:chOff x="0" y="0"/>
-          <a:chExt cx="0" cy="0"/>
-        </a:xfrm>
-      </p:grpSpPr>
-      <p:sp>
-        <p:nvSpPr>
-          <p:cNvPr id="2" name="Title 1">
-            <a:extLst>
-              <a:ext uri="{FF2B5EF4-FFF2-40B4-BE49-F238E27FC236}">
-                <a16:creationId xmlns:a16="http://schemas.microsoft.com/office/drawing/2014/main" id="{9A124F19-A653-02ED-88F1-B86C26B362FE}"/>
-              </a:ext>
-            </a:extLst>
-          </p:cNvPr>
-          <p:cNvSpPr>
-            <a:spLocks noGrp="1"/>
-          </p:cNvSpPr>
-          <p:nvPr>
-            <p:ph type="title"/>
-          </p:nvPr>
-        </p:nvSpPr>
-        <p:spPr/>
-        <p:txBody>
-          <a:bodyPr/>
-          <a:lstStyle/>
-          <a:p>
-            <a:r>
-              <a:rPr lang="hr-HR" dirty="0"/>
-              <a:t>POKUŠAJI POBOLJŠANJA REZULTATA:</a:t>
-            </a:r>
-            <a:endParaRPr lang="en-US" dirty="0"/>
-          </a:p>
-        </p:txBody>
-      </p:sp>
-      <p:sp>
-        <p:nvSpPr>
-          <p:cNvPr id="3" name="Content Placeholder 2">
-            <a:extLst>
-              <a:ext uri="{FF2B5EF4-FFF2-40B4-BE49-F238E27FC236}">
-                <a16:creationId xmlns:a16="http://schemas.microsoft.com/office/drawing/2014/main" id="{58B26000-2283-3369-F288-8382C075CDB8}"/>
-              </a:ext>
-            </a:extLst>
-          </p:cNvPr>
-          <p:cNvSpPr>
-            <a:spLocks noGrp="1"/>
-          </p:cNvSpPr>
-          <p:nvPr>
-            <p:ph idx="1"/>
-          </p:nvPr>
-        </p:nvSpPr>
-        <p:spPr/>
-        <p:txBody>
-          <a:bodyPr>
-            <a:normAutofit/>
-          </a:bodyPr>
-          <a:lstStyle/>
-          <a:p>
-            <a:pPr>
-              <a:buFont typeface="+mj-lt"/>
-              <a:buAutoNum type="arabicParenR"/>
-            </a:pPr>
-            <a:r>
-              <a:rPr lang="hr-HR" sz="3200" dirty="0"/>
-              <a:t> Zadržavanje samo korijena riječi</a:t>
-            </a:r>
-          </a:p>
-          <a:p>
-            <a:pPr>
-              <a:buFont typeface="+mj-lt"/>
-              <a:buAutoNum type="arabicParenR"/>
-            </a:pPr>
-            <a:r>
-              <a:rPr lang="hr-HR" sz="3200" dirty="0"/>
-              <a:t> Odabir optimalnih parametara</a:t>
-            </a:r>
-          </a:p>
-          <a:p>
-            <a:pPr>
-              <a:buFont typeface="+mj-lt"/>
-              <a:buAutoNum type="arabicParenR"/>
-            </a:pPr>
-            <a:r>
-              <a:rPr lang="hr-HR" sz="3200" dirty="0"/>
-              <a:t> </a:t>
-            </a:r>
-            <a:r>
-              <a:rPr lang="hr-HR" sz="3200" dirty="0" err="1"/>
-              <a:t>Regularizacija</a:t>
-            </a:r>
-            <a:endParaRPr lang="en-US" sz="3200" dirty="0"/>
-          </a:p>
-        </p:txBody>
-      </p:sp>
-    </p:spTree>
-    <p:extLst>
-      <p:ext uri="{BB962C8B-B14F-4D97-AF65-F5344CB8AC3E}">
-        <p14:creationId xmlns:p14="http://schemas.microsoft.com/office/powerpoint/2010/main" val="1752787219"/>
-      </p:ext>
-    </p:extLst>
-  </p:cSld>
-  <p:clrMapOvr>
-    <a:masterClrMapping/>
-  </p:clrMapOvr>
-</p:sld>
-</file>
-
 <file path=ppt/slides/slide5.xml><?xml version="1.0" encoding="utf-8"?>
 <p:sld xmlns:a="http://schemas.openxmlformats.org/drawingml/2006/main" xmlns:r="http://schemas.openxmlformats.org/officeDocument/2006/relationships" xmlns:p="http://schemas.openxmlformats.org/presentationml/2006/main">
   <p:cSld>
@@ -6630,7 +7018,7 @@
           <p:cNvPr id="2" name="Title 1">
             <a:extLst>
               <a:ext uri="{FF2B5EF4-FFF2-40B4-BE49-F238E27FC236}">
-                <a16:creationId xmlns:a16="http://schemas.microsoft.com/office/drawing/2014/main" id="{8E182440-6E80-E3D1-2302-06A6ABE01877}"/>
+                <a16:creationId xmlns:a16="http://schemas.microsoft.com/office/drawing/2014/main" id="{9A124F19-A653-02ED-88F1-B86C26B362FE}"/>
               </a:ext>
             </a:extLst>
           </p:cNvPr>
@@ -6648,7 +7036,7 @@
           <a:p>
             <a:r>
               <a:rPr lang="hr-HR" dirty="0"/>
-              <a:t>1) ZADRŽAVANJE SAMO KORIJENA RIJEČI</a:t>
+              <a:t>POKUŠAJI POBOLJŠANJA REZULTATA:</a:t>
             </a:r>
             <a:endParaRPr lang="en-US" dirty="0"/>
           </a:p>
@@ -6659,7 +7047,7 @@
           <p:cNvPr id="3" name="Content Placeholder 2">
             <a:extLst>
               <a:ext uri="{FF2B5EF4-FFF2-40B4-BE49-F238E27FC236}">
-                <a16:creationId xmlns:a16="http://schemas.microsoft.com/office/drawing/2014/main" id="{3DA3ADDA-06AB-B3AC-6E9E-F481DB9B0929}"/>
+                <a16:creationId xmlns:a16="http://schemas.microsoft.com/office/drawing/2014/main" id="{58B26000-2283-3369-F288-8382C075CDB8}"/>
               </a:ext>
             </a:extLst>
           </p:cNvPr>
@@ -6672,17 +7060,51 @@
         </p:nvSpPr>
         <p:spPr/>
         <p:txBody>
-          <a:bodyPr/>
-          <a:lstStyle/>
-          <a:p>
-            <a:endParaRPr lang="en-US"/>
+          <a:bodyPr>
+            <a:normAutofit/>
+          </a:bodyPr>
+          <a:lstStyle/>
+          <a:p>
+            <a:pPr>
+              <a:buFont typeface="+mj-lt"/>
+              <a:buAutoNum type="arabicParenR"/>
+            </a:pPr>
+            <a:r>
+              <a:rPr lang="hr-HR" sz="3200" dirty="0"/>
+              <a:t> Zadržavanje samo korijena riječi</a:t>
+            </a:r>
+          </a:p>
+          <a:p>
+            <a:pPr>
+              <a:buFont typeface="+mj-lt"/>
+              <a:buAutoNum type="arabicParenR"/>
+            </a:pPr>
+            <a:r>
+              <a:rPr lang="hr-HR" sz="3200" dirty="0"/>
+              <a:t> Odabir optimalnih parametara</a:t>
+            </a:r>
+          </a:p>
+          <a:p>
+            <a:pPr>
+              <a:buFont typeface="+mj-lt"/>
+              <a:buAutoNum type="arabicParenR"/>
+            </a:pPr>
+            <a:r>
+              <a:rPr lang="hr-HR" sz="3200" dirty="0"/>
+              <a:t> </a:t>
+            </a:r>
+            <a:r>
+              <a:rPr lang="hr-HR" sz="3200" dirty="0" err="1"/>
+              <a:t>Regularizacija</a:t>
+            </a:r>
+            <a:endParaRPr lang="en-US" sz="3200" dirty="0"/>
           </a:p>
         </p:txBody>
       </p:sp>
     </p:spTree>
     <p:extLst>
       <p:ext uri="{BB962C8B-B14F-4D97-AF65-F5344CB8AC3E}">
-        <p14:creationId xmlns:p14="http://schemas.microsoft.com/office/powerpoint/2010/main" val="2743833703"/>
+        <p14:creationId xmlns:p14="http://schemas.microsoft.com/office/powerpoint/2010/main" val="1752787219"/>
       </p:ext>
     </p:extLst>
   </p:cSld>
@@ -6714,7 +7136,7 @@
           <p:cNvPr id="2" name="Title 1">
             <a:extLst>
               <a:ext uri="{FF2B5EF4-FFF2-40B4-BE49-F238E27FC236}">
-                <a16:creationId xmlns:a16="http://schemas.microsoft.com/office/drawing/2014/main" id="{1BCA203C-CFCC-C1FA-8032-F563D17E5193}"/>
+                <a16:creationId xmlns:a16="http://schemas.microsoft.com/office/drawing/2014/main" id="{8E182440-6E80-E3D1-2302-06A6ABE01877}"/>
               </a:ext>
             </a:extLst>
           </p:cNvPr>
@@ -6732,7 +7154,7 @@
           <a:p>
             <a:r>
               <a:rPr lang="hr-HR" dirty="0"/>
-              <a:t>2) ODABIR OPTIMALNIH PARAMETARA</a:t>
+              <a:t>1) ZADRŽAVANJE SAMO KORIJENA RIJEČI</a:t>
             </a:r>
             <a:endParaRPr lang="en-US" dirty="0"/>
           </a:p>
@@ -6743,7 +7165,7 @@
           <p:cNvPr id="3" name="Content Placeholder 2">
             <a:extLst>
               <a:ext uri="{FF2B5EF4-FFF2-40B4-BE49-F238E27FC236}">
-                <a16:creationId xmlns:a16="http://schemas.microsoft.com/office/drawing/2014/main" id="{5551A416-1DF0-DFFF-1F73-3870DEC5100F}"/>
+                <a16:creationId xmlns:a16="http://schemas.microsoft.com/office/drawing/2014/main" id="{3DA3ADDA-06AB-B3AC-6E9E-F481DB9B0929}"/>
               </a:ext>
             </a:extLst>
           </p:cNvPr>
@@ -6759,14 +7181,61 @@
           <a:bodyPr/>
           <a:lstStyle/>
           <a:p>
-            <a:endParaRPr lang="en-US"/>
+            <a:r>
+              <a:rPr lang="hr-HR" dirty="0"/>
+              <a:t>Micanje prefiksa i sufiksa riječi</a:t>
+            </a:r>
+          </a:p>
+          <a:p>
+            <a:r>
+              <a:rPr lang="hr-HR" dirty="0"/>
+              <a:t>npr. </a:t>
+            </a:r>
+            <a:r>
+              <a:rPr lang="hr-HR" dirty="0" err="1"/>
+              <a:t>playing</a:t>
+            </a:r>
+            <a:r>
+              <a:rPr lang="hr-HR" dirty="0"/>
+              <a:t>, </a:t>
+            </a:r>
+            <a:r>
+              <a:rPr lang="hr-HR" dirty="0" err="1"/>
+              <a:t>plays</a:t>
+            </a:r>
+            <a:r>
+              <a:rPr lang="hr-HR" dirty="0"/>
+              <a:t>, </a:t>
+            </a:r>
+            <a:r>
+              <a:rPr lang="hr-HR" dirty="0" err="1"/>
+              <a:t>played</a:t>
+            </a:r>
+            <a:r>
+              <a:rPr lang="hr-HR" dirty="0"/>
+              <a:t> -&gt; </a:t>
+            </a:r>
+            <a:r>
+              <a:rPr lang="hr-HR" dirty="0" err="1"/>
+              <a:t>play</a:t>
+            </a:r>
+            <a:endParaRPr lang="hr-HR" dirty="0"/>
+          </a:p>
+          <a:p>
+            <a:r>
+              <a:rPr lang="hr-HR" dirty="0"/>
+              <a:t>Povećavanje sličnosti između članaka</a:t>
+            </a:r>
+          </a:p>
+          <a:p>
+            <a:endParaRPr lang="en-US" dirty="0"/>
           </a:p>
         </p:txBody>
       </p:sp>
     </p:spTree>
     <p:extLst>
       <p:ext uri="{BB962C8B-B14F-4D97-AF65-F5344CB8AC3E}">
-        <p14:creationId xmlns:p14="http://schemas.microsoft.com/office/powerpoint/2010/main" val="2848896524"/>
+        <p14:creationId xmlns:p14="http://schemas.microsoft.com/office/powerpoint/2010/main" val="2743833703"/>
       </p:ext>
     </p:extLst>
   </p:cSld>
@@ -6777,6 +7246,298 @@
 </file>
 
 <file path=ppt/slides/slide7.xml><?xml version="1.0" encoding="utf-8"?>
+<p:sld xmlns:a="http://schemas.openxmlformats.org/drawingml/2006/main" xmlns:r="http://schemas.openxmlformats.org/officeDocument/2006/relationships" xmlns:p="http://schemas.openxmlformats.org/presentationml/2006/main">
+  <p:cSld>
+    <p:bg>
+      <p:bgPr>
+        <a:solidFill>
+          <a:schemeClr val="bg1"/>
+        </a:solidFill>
+        <a:effectLst/>
+      </p:bgPr>
+    </p:bg>
+    <p:spTree>
+      <p:nvGrpSpPr>
+        <p:cNvPr id="1" name=""/>
+        <p:cNvGrpSpPr/>
+        <p:nvPr/>
+      </p:nvGrpSpPr>
+      <p:grpSpPr>
+        <a:xfrm>
+          <a:off x="0" y="0"/>
+          <a:ext cx="0" cy="0"/>
+          <a:chOff x="0" y="0"/>
+          <a:chExt cx="0" cy="0"/>
+        </a:xfrm>
+      </p:grpSpPr>
+      <p:sp>
+        <p:nvSpPr>
+          <p:cNvPr id="2" name="Title 1">
+            <a:extLst>
+              <a:ext uri="{FF2B5EF4-FFF2-40B4-BE49-F238E27FC236}">
+                <a16:creationId xmlns:a16="http://schemas.microsoft.com/office/drawing/2014/main" id="{E969A5E3-E1AD-0AA3-8028-D32E6762D09C}"/>
+              </a:ext>
+            </a:extLst>
+          </p:cNvPr>
+          <p:cNvSpPr>
+            <a:spLocks noGrp="1"/>
+          </p:cNvSpPr>
+          <p:nvPr>
+            <p:ph type="title"/>
+          </p:nvPr>
+        </p:nvSpPr>
+        <p:spPr>
+          <a:xfrm>
+            <a:off x="677334" y="609600"/>
+            <a:ext cx="8596668" cy="1320800"/>
+          </a:xfrm>
+        </p:spPr>
+        <p:txBody>
+          <a:bodyPr anchor="t">
+            <a:normAutofit/>
+          </a:bodyPr>
+          <a:lstStyle/>
+          <a:p>
+            <a:r>
+              <a:rPr lang="hr-HR" dirty="0"/>
+              <a:t>1) ZADRŽAVANJE SAMO KORIJENA RIJEČI</a:t>
+            </a:r>
+            <a:endParaRPr lang="en-US" dirty="0"/>
+          </a:p>
+        </p:txBody>
+      </p:sp>
+      <p:sp>
+        <p:nvSpPr>
+          <p:cNvPr id="3" name="Content Placeholder 2">
+            <a:extLst>
+              <a:ext uri="{FF2B5EF4-FFF2-40B4-BE49-F238E27FC236}">
+                <a16:creationId xmlns:a16="http://schemas.microsoft.com/office/drawing/2014/main" id="{A1488B5E-35C2-B826-E3A7-954793A2B389}"/>
+              </a:ext>
+            </a:extLst>
+          </p:cNvPr>
+          <p:cNvSpPr>
+            <a:spLocks noGrp="1"/>
+          </p:cNvSpPr>
+          <p:nvPr>
+            <p:ph idx="1"/>
+          </p:nvPr>
+        </p:nvSpPr>
+        <p:spPr>
+          <a:xfrm>
+            <a:off x="6336287" y="2160589"/>
+            <a:ext cx="2934714" cy="3880773"/>
+          </a:xfrm>
+        </p:spPr>
+        <p:txBody>
+          <a:bodyPr>
+            <a:normAutofit/>
+          </a:bodyPr>
+          <a:lstStyle/>
+          <a:p>
+            <a:r>
+              <a:rPr lang="hr-HR" dirty="0"/>
+              <a:t>Gledamo rezultate za različite vrijednosti k</a:t>
+            </a:r>
+          </a:p>
+          <a:p>
+            <a:r>
+              <a:rPr lang="hr-HR" dirty="0"/>
+              <a:t>Došlo do malih poboljšanja u rezultatima</a:t>
+            </a:r>
+            <a:endParaRPr lang="en-US" dirty="0"/>
+          </a:p>
+        </p:txBody>
+      </p:sp>
+      <p:pic>
+        <p:nvPicPr>
+          <p:cNvPr id="5" name="Picture 4">
+            <a:extLst>
+              <a:ext uri="{FF2B5EF4-FFF2-40B4-BE49-F238E27FC236}">
+                <a16:creationId xmlns:a16="http://schemas.microsoft.com/office/drawing/2014/main" id="{A3DB9B00-8A68-9EBE-10EB-ECEE95E1B53F}"/>
+              </a:ext>
+            </a:extLst>
+          </p:cNvPr>
+          <p:cNvPicPr>
+            <a:picLocks noChangeAspect="1"/>
+          </p:cNvPicPr>
+          <p:nvPr/>
+        </p:nvPicPr>
+        <p:blipFill>
+          <a:blip r:embed="rId2"/>
+          <a:stretch>
+            <a:fillRect/>
+          </a:stretch>
+        </p:blipFill>
+        <p:spPr>
+          <a:xfrm>
+            <a:off x="677334" y="1270000"/>
+            <a:ext cx="5418666" cy="5178425"/>
+          </a:xfrm>
+          <a:prstGeom prst="rect">
+            <a:avLst/>
+          </a:prstGeom>
+        </p:spPr>
+      </p:pic>
+    </p:spTree>
+    <p:extLst>
+      <p:ext uri="{BB962C8B-B14F-4D97-AF65-F5344CB8AC3E}">
+        <p14:creationId xmlns:p14="http://schemas.microsoft.com/office/powerpoint/2010/main" val="2218648376"/>
+      </p:ext>
+    </p:extLst>
+  </p:cSld>
+  <p:clrMapOvr>
+    <a:masterClrMapping/>
+  </p:clrMapOvr>
+</p:sld>
+</file>
+
+<file path=ppt/slides/slide8.xml><?xml version="1.0" encoding="utf-8"?>
+<p:sld xmlns:a="http://schemas.openxmlformats.org/drawingml/2006/main" xmlns:r="http://schemas.openxmlformats.org/officeDocument/2006/relationships" xmlns:p="http://schemas.openxmlformats.org/presentationml/2006/main">
+  <p:cSld>
+    <p:bg>
+      <p:bgPr>
+        <a:solidFill>
+          <a:schemeClr val="bg1"/>
+        </a:solidFill>
+        <a:effectLst/>
+      </p:bgPr>
+    </p:bg>
+    <p:spTree>
+      <p:nvGrpSpPr>
+        <p:cNvPr id="1" name=""/>
+        <p:cNvGrpSpPr/>
+        <p:nvPr/>
+      </p:nvGrpSpPr>
+      <p:grpSpPr>
+        <a:xfrm>
+          <a:off x="0" y="0"/>
+          <a:ext cx="0" cy="0"/>
+          <a:chOff x="0" y="0"/>
+          <a:chExt cx="0" cy="0"/>
+        </a:xfrm>
+      </p:grpSpPr>
+      <p:sp>
+        <p:nvSpPr>
+          <p:cNvPr id="2" name="Title 1">
+            <a:extLst>
+              <a:ext uri="{FF2B5EF4-FFF2-40B4-BE49-F238E27FC236}">
+                <a16:creationId xmlns:a16="http://schemas.microsoft.com/office/drawing/2014/main" id="{E969A5E3-E1AD-0AA3-8028-D32E6762D09C}"/>
+              </a:ext>
+            </a:extLst>
+          </p:cNvPr>
+          <p:cNvSpPr>
+            <a:spLocks noGrp="1"/>
+          </p:cNvSpPr>
+          <p:nvPr>
+            <p:ph type="title"/>
+          </p:nvPr>
+        </p:nvSpPr>
+        <p:spPr>
+          <a:xfrm>
+            <a:off x="677334" y="609600"/>
+            <a:ext cx="8596668" cy="1320800"/>
+          </a:xfrm>
+        </p:spPr>
+        <p:txBody>
+          <a:bodyPr anchor="t">
+            <a:normAutofit/>
+          </a:bodyPr>
+          <a:lstStyle/>
+          <a:p>
+            <a:r>
+              <a:rPr lang="hr-HR" dirty="0"/>
+              <a:t>1) ZADRŽAVANJE SAMO KORIJENA RIJEČI</a:t>
+            </a:r>
+            <a:endParaRPr lang="en-US" dirty="0"/>
+          </a:p>
+        </p:txBody>
+      </p:sp>
+      <p:sp>
+        <p:nvSpPr>
+          <p:cNvPr id="3" name="Content Placeholder 2">
+            <a:extLst>
+              <a:ext uri="{FF2B5EF4-FFF2-40B4-BE49-F238E27FC236}">
+                <a16:creationId xmlns:a16="http://schemas.microsoft.com/office/drawing/2014/main" id="{A1488B5E-35C2-B826-E3A7-954793A2B389}"/>
+              </a:ext>
+            </a:extLst>
+          </p:cNvPr>
+          <p:cNvSpPr>
+            <a:spLocks noGrp="1"/>
+          </p:cNvSpPr>
+          <p:nvPr>
+            <p:ph idx="1"/>
+          </p:nvPr>
+        </p:nvSpPr>
+        <p:spPr>
+          <a:xfrm>
+            <a:off x="6336287" y="2160589"/>
+            <a:ext cx="2934714" cy="3880773"/>
+          </a:xfrm>
+        </p:spPr>
+        <p:txBody>
+          <a:bodyPr>
+            <a:normAutofit/>
+          </a:bodyPr>
+          <a:lstStyle/>
+          <a:p>
+            <a:r>
+              <a:rPr lang="hr-HR" dirty="0"/>
+              <a:t>Gledamo rezultate za različite vrijednosti lambda</a:t>
+            </a:r>
+          </a:p>
+          <a:p>
+            <a:r>
+              <a:rPr lang="hr-HR" dirty="0"/>
+              <a:t>Nije postignuto veliko poboljšanje u rezultatima</a:t>
+            </a:r>
+            <a:endParaRPr lang="en-US" dirty="0"/>
+          </a:p>
+        </p:txBody>
+      </p:sp>
+      <p:pic>
+        <p:nvPicPr>
+          <p:cNvPr id="5" name="Picture 4">
+            <a:extLst>
+              <a:ext uri="{FF2B5EF4-FFF2-40B4-BE49-F238E27FC236}">
+                <a16:creationId xmlns:a16="http://schemas.microsoft.com/office/drawing/2014/main" id="{59F3DCE0-6E28-7FF1-E7A3-B4A8A15B1A13}"/>
+              </a:ext>
+            </a:extLst>
+          </p:cNvPr>
+          <p:cNvPicPr>
+            <a:picLocks noChangeAspect="1"/>
+          </p:cNvPicPr>
+          <p:nvPr/>
+        </p:nvPicPr>
+        <p:blipFill>
+          <a:blip r:embed="rId2"/>
+          <a:stretch>
+            <a:fillRect/>
+          </a:stretch>
+        </p:blipFill>
+        <p:spPr>
+          <a:xfrm>
+            <a:off x="677334" y="1270000"/>
+            <a:ext cx="5418666" cy="5210175"/>
+          </a:xfrm>
+          <a:prstGeom prst="rect">
+            <a:avLst/>
+          </a:prstGeom>
+        </p:spPr>
+      </p:pic>
+    </p:spTree>
+    <p:extLst>
+      <p:ext uri="{BB962C8B-B14F-4D97-AF65-F5344CB8AC3E}">
+        <p14:creationId xmlns:p14="http://schemas.microsoft.com/office/powerpoint/2010/main" val="3031923303"/>
+      </p:ext>
+    </p:extLst>
+  </p:cSld>
+  <p:clrMapOvr>
+    <a:masterClrMapping/>
+  </p:clrMapOvr>
+</p:sld>
+</file>
+
+<file path=ppt/slides/slide9.xml><?xml version="1.0" encoding="utf-8"?>
 <p:sld xmlns:a="http://schemas.openxmlformats.org/drawingml/2006/main" xmlns:r="http://schemas.openxmlformats.org/officeDocument/2006/relationships" xmlns:p="http://schemas.openxmlformats.org/presentationml/2006/main">
   <p:cSld>
     <p:spTree>
@@ -6798,7 +7559,7 @@
           <p:cNvPr id="2" name="Title 1">
             <a:extLst>
               <a:ext uri="{FF2B5EF4-FFF2-40B4-BE49-F238E27FC236}">
-                <a16:creationId xmlns:a16="http://schemas.microsoft.com/office/drawing/2014/main" id="{3B7A3E26-276A-3C77-9F09-48B55DF68F66}"/>
+                <a16:creationId xmlns:a16="http://schemas.microsoft.com/office/drawing/2014/main" id="{1BCA203C-CFCC-C1FA-8032-F563D17E5193}"/>
               </a:ext>
             </a:extLst>
           </p:cNvPr>
@@ -6816,7 +7577,7 @@
           <a:p>
             <a:r>
               <a:rPr lang="hr-HR" dirty="0"/>
-              <a:t>3) REGULARIZACIJA</a:t>
+              <a:t>2) ODABIR OPTIMALNIH PARAMETARA</a:t>
             </a:r>
             <a:endParaRPr lang="en-US" dirty="0"/>
           </a:p>
@@ -6827,7 +7588,7 @@
           <p:cNvPr id="3" name="Content Placeholder 2">
             <a:extLst>
               <a:ext uri="{FF2B5EF4-FFF2-40B4-BE49-F238E27FC236}">
-                <a16:creationId xmlns:a16="http://schemas.microsoft.com/office/drawing/2014/main" id="{73731AEF-8FE9-4FBA-D09D-37FBC67444DD}"/>
+                <a16:creationId xmlns:a16="http://schemas.microsoft.com/office/drawing/2014/main" id="{5551A416-1DF0-DFFF-1F73-3870DEC5100F}"/>
               </a:ext>
             </a:extLst>
           </p:cNvPr>
@@ -6850,7 +7611,7 @@
     </p:spTree>
     <p:extLst>
       <p:ext uri="{BB962C8B-B14F-4D97-AF65-F5344CB8AC3E}">
-        <p14:creationId xmlns:p14="http://schemas.microsoft.com/office/powerpoint/2010/main" val="478732706"/>
+        <p14:creationId xmlns:p14="http://schemas.microsoft.com/office/powerpoint/2010/main" val="2848896524"/>
       </p:ext>
     </p:extLst>
   </p:cSld>

</xml_diff>

<commit_message>
dodano sve, jako šturo... treba još regularizacija
</commit_message>
<xml_diff>
--- a/UZOP_prezentacija.pptx
+++ b/UZOP_prezentacija.pptx
@@ -14,7 +14,10 @@
     <p:sldId id="264" r:id="rId8"/>
     <p:sldId id="266" r:id="rId9"/>
     <p:sldId id="261" r:id="rId10"/>
-    <p:sldId id="262" r:id="rId11"/>
+    <p:sldId id="267" r:id="rId11"/>
+    <p:sldId id="262" r:id="rId12"/>
+    <p:sldId id="269" r:id="rId13"/>
+    <p:sldId id="268" r:id="rId14"/>
   </p:sldIdLst>
   <p:sldSz cx="12192000" cy="6858000"/>
   <p:notesSz cx="6858000" cy="9144000"/>
@@ -6201,6 +6204,14 @@
 <file path=ppt/slides/slide10.xml><?xml version="1.0" encoding="utf-8"?>
 <p:sld xmlns:a="http://schemas.openxmlformats.org/drawingml/2006/main" xmlns:r="http://schemas.openxmlformats.org/officeDocument/2006/relationships" xmlns:p="http://schemas.openxmlformats.org/presentationml/2006/main">
   <p:cSld>
+    <p:bg>
+      <p:bgPr>
+        <a:solidFill>
+          <a:schemeClr val="bg1"/>
+        </a:solidFill>
+        <a:effectLst/>
+      </p:bgPr>
+    </p:bg>
     <p:spTree>
       <p:nvGrpSpPr>
         <p:cNvPr id="1" name=""/>
@@ -6220,6 +6231,138 @@
           <p:cNvPr id="2" name="Title 1">
             <a:extLst>
               <a:ext uri="{FF2B5EF4-FFF2-40B4-BE49-F238E27FC236}">
+                <a16:creationId xmlns:a16="http://schemas.microsoft.com/office/drawing/2014/main" id="{893BBFAE-B1A5-6987-AB89-2ED5BB0566D3}"/>
+              </a:ext>
+            </a:extLst>
+          </p:cNvPr>
+          <p:cNvSpPr>
+            <a:spLocks noGrp="1"/>
+          </p:cNvSpPr>
+          <p:nvPr>
+            <p:ph type="title"/>
+          </p:nvPr>
+        </p:nvSpPr>
+        <p:spPr>
+          <a:xfrm>
+            <a:off x="677334" y="609600"/>
+            <a:ext cx="8596668" cy="1320800"/>
+          </a:xfrm>
+        </p:spPr>
+        <p:txBody>
+          <a:bodyPr anchor="t">
+            <a:normAutofit/>
+          </a:bodyPr>
+          <a:lstStyle/>
+          <a:p>
+            <a:r>
+              <a:rPr lang="hr-HR" dirty="0"/>
+              <a:t>2) ODABIR OPTIMALNIH PARAMETARA</a:t>
+            </a:r>
+            <a:endParaRPr lang="en-US" dirty="0"/>
+          </a:p>
+        </p:txBody>
+      </p:sp>
+      <p:pic>
+        <p:nvPicPr>
+          <p:cNvPr id="5" name="Picture 4">
+            <a:extLst>
+              <a:ext uri="{FF2B5EF4-FFF2-40B4-BE49-F238E27FC236}">
+                <a16:creationId xmlns:a16="http://schemas.microsoft.com/office/drawing/2014/main" id="{2301A905-EA5C-4B1D-4607-CE669E546E81}"/>
+              </a:ext>
+            </a:extLst>
+          </p:cNvPr>
+          <p:cNvPicPr>
+            <a:picLocks noChangeAspect="1"/>
+          </p:cNvPicPr>
+          <p:nvPr/>
+        </p:nvPicPr>
+        <p:blipFill>
+          <a:blip r:embed="rId2"/>
+          <a:stretch>
+            <a:fillRect/>
+          </a:stretch>
+        </p:blipFill>
+        <p:spPr>
+          <a:xfrm>
+            <a:off x="237148" y="1608303"/>
+            <a:ext cx="6267669" cy="3744932"/>
+          </a:xfrm>
+          <a:prstGeom prst="rect">
+            <a:avLst/>
+          </a:prstGeom>
+        </p:spPr>
+      </p:pic>
+      <p:sp>
+        <p:nvSpPr>
+          <p:cNvPr id="3" name="Content Placeholder 2">
+            <a:extLst>
+              <a:ext uri="{FF2B5EF4-FFF2-40B4-BE49-F238E27FC236}">
+                <a16:creationId xmlns:a16="http://schemas.microsoft.com/office/drawing/2014/main" id="{C83BFC94-5197-5E4A-B8F3-7FE8A02B7ECB}"/>
+              </a:ext>
+            </a:extLst>
+          </p:cNvPr>
+          <p:cNvSpPr>
+            <a:spLocks noGrp="1"/>
+          </p:cNvSpPr>
+          <p:nvPr>
+            <p:ph idx="1"/>
+          </p:nvPr>
+        </p:nvSpPr>
+        <p:spPr>
+          <a:xfrm>
+            <a:off x="6611347" y="2159331"/>
+            <a:ext cx="2927185" cy="3880773"/>
+          </a:xfrm>
+        </p:spPr>
+        <p:txBody>
+          <a:bodyPr>
+            <a:normAutofit/>
+          </a:bodyPr>
+          <a:lstStyle/>
+          <a:p>
+            <a:r>
+              <a:rPr lang="hr-HR" sz="1500" dirty="0"/>
+              <a:t>Rezultati prikazani u tablici</a:t>
+            </a:r>
+            <a:endParaRPr lang="en-US" sz="1500" dirty="0"/>
+          </a:p>
+        </p:txBody>
+      </p:sp>
+    </p:spTree>
+    <p:extLst>
+      <p:ext uri="{BB962C8B-B14F-4D97-AF65-F5344CB8AC3E}">
+        <p14:creationId xmlns:p14="http://schemas.microsoft.com/office/powerpoint/2010/main" val="587650028"/>
+      </p:ext>
+    </p:extLst>
+  </p:cSld>
+  <p:clrMapOvr>
+    <a:masterClrMapping/>
+  </p:clrMapOvr>
+</p:sld>
+</file>
+
+<file path=ppt/slides/slide11.xml><?xml version="1.0" encoding="utf-8"?>
+<p:sld xmlns:a="http://schemas.openxmlformats.org/drawingml/2006/main" xmlns:r="http://schemas.openxmlformats.org/officeDocument/2006/relationships" xmlns:p="http://schemas.openxmlformats.org/presentationml/2006/main">
+  <p:cSld>
+    <p:spTree>
+      <p:nvGrpSpPr>
+        <p:cNvPr id="1" name=""/>
+        <p:cNvGrpSpPr/>
+        <p:nvPr/>
+      </p:nvGrpSpPr>
+      <p:grpSpPr>
+        <a:xfrm>
+          <a:off x="0" y="0"/>
+          <a:ext cx="0" cy="0"/>
+          <a:chOff x="0" y="0"/>
+          <a:chExt cx="0" cy="0"/>
+        </a:xfrm>
+      </p:grpSpPr>
+      <p:sp>
+        <p:nvSpPr>
+          <p:cNvPr id="2" name="Title 1">
+            <a:extLst>
+              <a:ext uri="{FF2B5EF4-FFF2-40B4-BE49-F238E27FC236}">
                 <a16:creationId xmlns:a16="http://schemas.microsoft.com/office/drawing/2014/main" id="{3B7A3E26-276A-3C77-9F09-48B55DF68F66}"/>
               </a:ext>
             </a:extLst>
@@ -6265,7 +6408,39 @@
           <a:bodyPr/>
           <a:lstStyle/>
           <a:p>
-            <a:endParaRPr lang="en-US"/>
+            <a:r>
+              <a:rPr lang="hr-HR" dirty="0"/>
+              <a:t>Odabir </a:t>
+            </a:r>
+            <a:r>
+              <a:rPr lang="hr-HR" dirty="0" err="1"/>
+              <a:t>hiperparametra</a:t>
+            </a:r>
+            <a:r>
+              <a:rPr lang="hr-HR" dirty="0"/>
+              <a:t> C</a:t>
+            </a:r>
+          </a:p>
+          <a:p>
+            <a:r>
+              <a:rPr lang="hr-HR" dirty="0"/>
+              <a:t>Testiramo za vrijednosti 0.01, 1 i 1000</a:t>
+            </a:r>
+          </a:p>
+          <a:p>
+            <a:r>
+              <a:rPr lang="hr-HR" dirty="0"/>
+              <a:t>Manji C znači  da je </a:t>
+            </a:r>
+            <a:r>
+              <a:rPr lang="hr-HR" dirty="0" err="1"/>
+              <a:t>regularizacija</a:t>
+            </a:r>
+            <a:r>
+              <a:rPr lang="hr-HR" dirty="0"/>
+              <a:t> jača</a:t>
+            </a:r>
+            <a:endParaRPr lang="en-US" dirty="0"/>
           </a:p>
         </p:txBody>
       </p:sp>
@@ -6273,6 +6448,223 @@
     <p:extLst>
       <p:ext uri="{BB962C8B-B14F-4D97-AF65-F5344CB8AC3E}">
         <p14:creationId xmlns:p14="http://schemas.microsoft.com/office/powerpoint/2010/main" val="478732706"/>
+      </p:ext>
+    </p:extLst>
+  </p:cSld>
+  <p:clrMapOvr>
+    <a:masterClrMapping/>
+  </p:clrMapOvr>
+</p:sld>
+</file>
+
+<file path=ppt/slides/slide12.xml><?xml version="1.0" encoding="utf-8"?>
+<p:sld xmlns:a="http://schemas.openxmlformats.org/drawingml/2006/main" xmlns:r="http://schemas.openxmlformats.org/officeDocument/2006/relationships" xmlns:p="http://schemas.openxmlformats.org/presentationml/2006/main">
+  <p:cSld>
+    <p:spTree>
+      <p:nvGrpSpPr>
+        <p:cNvPr id="1" name=""/>
+        <p:cNvGrpSpPr/>
+        <p:nvPr/>
+      </p:nvGrpSpPr>
+      <p:grpSpPr>
+        <a:xfrm>
+          <a:off x="0" y="0"/>
+          <a:ext cx="0" cy="0"/>
+          <a:chOff x="0" y="0"/>
+          <a:chExt cx="0" cy="0"/>
+        </a:xfrm>
+      </p:grpSpPr>
+      <p:sp>
+        <p:nvSpPr>
+          <p:cNvPr id="2" name="Title 1">
+            <a:extLst>
+              <a:ext uri="{FF2B5EF4-FFF2-40B4-BE49-F238E27FC236}">
+                <a16:creationId xmlns:a16="http://schemas.microsoft.com/office/drawing/2014/main" id="{5DBDD4D8-93C4-BBDD-CB25-CE800487410C}"/>
+              </a:ext>
+            </a:extLst>
+          </p:cNvPr>
+          <p:cNvSpPr>
+            <a:spLocks noGrp="1"/>
+          </p:cNvSpPr>
+          <p:nvPr>
+            <p:ph type="title"/>
+          </p:nvPr>
+        </p:nvSpPr>
+        <p:spPr/>
+        <p:txBody>
+          <a:bodyPr/>
+          <a:lstStyle/>
+          <a:p>
+            <a:r>
+              <a:rPr lang="hr-HR" dirty="0"/>
+              <a:t>3) REGULARIZACIJA</a:t>
+            </a:r>
+            <a:endParaRPr lang="en-US" dirty="0"/>
+          </a:p>
+        </p:txBody>
+      </p:sp>
+      <p:sp>
+        <p:nvSpPr>
+          <p:cNvPr id="3" name="Content Placeholder 2">
+            <a:extLst>
+              <a:ext uri="{FF2B5EF4-FFF2-40B4-BE49-F238E27FC236}">
+                <a16:creationId xmlns:a16="http://schemas.microsoft.com/office/drawing/2014/main" id="{9F3A6934-3F1F-BFE1-1893-F82816B91EBF}"/>
+              </a:ext>
+            </a:extLst>
+          </p:cNvPr>
+          <p:cNvSpPr>
+            <a:spLocks noGrp="1"/>
+          </p:cNvSpPr>
+          <p:nvPr>
+            <p:ph idx="1"/>
+          </p:nvPr>
+        </p:nvSpPr>
+        <p:spPr/>
+        <p:txBody>
+          <a:bodyPr/>
+          <a:lstStyle/>
+          <a:p>
+            <a:r>
+              <a:rPr lang="hr-HR" dirty="0"/>
+              <a:t>Neki rezultati za ovaj dio (tablica, graf, komentari)…</a:t>
+            </a:r>
+            <a:endParaRPr lang="en-US" dirty="0"/>
+          </a:p>
+        </p:txBody>
+      </p:sp>
+    </p:spTree>
+    <p:extLst>
+      <p:ext uri="{BB962C8B-B14F-4D97-AF65-F5344CB8AC3E}">
+        <p14:creationId xmlns:p14="http://schemas.microsoft.com/office/powerpoint/2010/main" val="3309958530"/>
+      </p:ext>
+    </p:extLst>
+  </p:cSld>
+  <p:clrMapOvr>
+    <a:masterClrMapping/>
+  </p:clrMapOvr>
+</p:sld>
+</file>
+
+<file path=ppt/slides/slide13.xml><?xml version="1.0" encoding="utf-8"?>
+<p:sld xmlns:a="http://schemas.openxmlformats.org/drawingml/2006/main" xmlns:r="http://schemas.openxmlformats.org/officeDocument/2006/relationships" xmlns:p="http://schemas.openxmlformats.org/presentationml/2006/main">
+  <p:cSld>
+    <p:spTree>
+      <p:nvGrpSpPr>
+        <p:cNvPr id="1" name=""/>
+        <p:cNvGrpSpPr/>
+        <p:nvPr/>
+      </p:nvGrpSpPr>
+      <p:grpSpPr>
+        <a:xfrm>
+          <a:off x="0" y="0"/>
+          <a:ext cx="0" cy="0"/>
+          <a:chOff x="0" y="0"/>
+          <a:chExt cx="0" cy="0"/>
+        </a:xfrm>
+      </p:grpSpPr>
+      <p:sp>
+        <p:nvSpPr>
+          <p:cNvPr id="2" name="Title 1">
+            <a:extLst>
+              <a:ext uri="{FF2B5EF4-FFF2-40B4-BE49-F238E27FC236}">
+                <a16:creationId xmlns:a16="http://schemas.microsoft.com/office/drawing/2014/main" id="{C1875DF9-89B9-20C6-4685-DDFD73173D78}"/>
+              </a:ext>
+            </a:extLst>
+          </p:cNvPr>
+          <p:cNvSpPr>
+            <a:spLocks noGrp="1"/>
+          </p:cNvSpPr>
+          <p:nvPr>
+            <p:ph type="title"/>
+          </p:nvPr>
+        </p:nvSpPr>
+        <p:spPr/>
+        <p:txBody>
+          <a:bodyPr/>
+          <a:lstStyle/>
+          <a:p>
+            <a:r>
+              <a:rPr lang="hr-HR" dirty="0"/>
+              <a:t>ZAKLJUČAK</a:t>
+            </a:r>
+            <a:endParaRPr lang="en-US" dirty="0"/>
+          </a:p>
+        </p:txBody>
+      </p:sp>
+      <p:sp>
+        <p:nvSpPr>
+          <p:cNvPr id="3" name="Content Placeholder 2">
+            <a:extLst>
+              <a:ext uri="{FF2B5EF4-FFF2-40B4-BE49-F238E27FC236}">
+                <a16:creationId xmlns:a16="http://schemas.microsoft.com/office/drawing/2014/main" id="{CA4A0C61-C96C-0777-1F02-4BEBD1815C07}"/>
+              </a:ext>
+            </a:extLst>
+          </p:cNvPr>
+          <p:cNvSpPr>
+            <a:spLocks noGrp="1"/>
+          </p:cNvSpPr>
+          <p:nvPr>
+            <p:ph idx="1"/>
+          </p:nvPr>
+        </p:nvSpPr>
+        <p:spPr/>
+        <p:txBody>
+          <a:bodyPr/>
+          <a:lstStyle/>
+          <a:p>
+            <a:r>
+              <a:rPr lang="hr-HR" dirty="0"/>
+              <a:t>Zadržavanje samo korijena riječi</a:t>
+            </a:r>
+          </a:p>
+          <a:p>
+            <a:pPr lvl="1"/>
+            <a:r>
+              <a:rPr lang="hr-HR" dirty="0"/>
+              <a:t>Došlo do malih poboljšanja u rezultatima</a:t>
+            </a:r>
+          </a:p>
+          <a:p>
+            <a:r>
+              <a:rPr lang="hr-HR" dirty="0"/>
+              <a:t>Odabir optimalnih parametara</a:t>
+            </a:r>
+          </a:p>
+          <a:p>
+            <a:pPr lvl="1"/>
+            <a:r>
+              <a:rPr lang="hr-HR" dirty="0"/>
+              <a:t>Pronađene optimalne kombinacije k i lambda</a:t>
+            </a:r>
+          </a:p>
+          <a:p>
+            <a:pPr lvl="1"/>
+            <a:r>
+              <a:rPr lang="hr-HR" dirty="0"/>
+              <a:t>Pronađene za sve kombinacije kategorija i jezgra</a:t>
+            </a:r>
+          </a:p>
+          <a:p>
+            <a:r>
+              <a:rPr lang="hr-HR" dirty="0" err="1"/>
+              <a:t>Regularizacija</a:t>
+            </a:r>
+            <a:endParaRPr lang="hr-HR" dirty="0"/>
+          </a:p>
+          <a:p>
+            <a:pPr lvl="1"/>
+            <a:r>
+              <a:rPr lang="hr-HR" dirty="0"/>
+              <a:t>Nešto napisati za ovo…</a:t>
+            </a:r>
+            <a:endParaRPr lang="en-US" dirty="0"/>
+          </a:p>
+        </p:txBody>
+      </p:sp>
+    </p:spTree>
+    <p:extLst>
+      <p:ext uri="{BB962C8B-B14F-4D97-AF65-F5344CB8AC3E}">
+        <p14:creationId xmlns:p14="http://schemas.microsoft.com/office/powerpoint/2010/main" val="2632932935"/>
       </p:ext>
     </p:extLst>
   </p:cSld>
@@ -7604,7 +7996,34 @@
           <a:bodyPr/>
           <a:lstStyle/>
           <a:p>
-            <a:endParaRPr lang="en-US"/>
+            <a:r>
+              <a:rPr lang="hr-HR" dirty="0"/>
+              <a:t>Pronalazak optimalnih parametara k i lambda</a:t>
+            </a:r>
+          </a:p>
+          <a:p>
+            <a:r>
+              <a:rPr lang="hr-HR" dirty="0"/>
+              <a:t>Optimalni = oni za koje je F1 najveći</a:t>
+            </a:r>
+          </a:p>
+          <a:p>
+            <a:r>
+              <a:rPr lang="hr-HR" dirty="0"/>
+              <a:t>Grid </a:t>
+            </a:r>
+            <a:r>
+              <a:rPr lang="hr-HR" dirty="0" err="1"/>
+              <a:t>search</a:t>
+            </a:r>
+            <a:endParaRPr lang="hr-HR" dirty="0"/>
+          </a:p>
+          <a:p>
+            <a:r>
+              <a:rPr lang="hr-HR" dirty="0"/>
+              <a:t>Ovo radimo za svaku kategoriju i za svaku jezgru</a:t>
+            </a:r>
+            <a:endParaRPr lang="en-US" dirty="0"/>
           </a:p>
         </p:txBody>
       </p:sp>

</xml_diff>

<commit_message>
dodano još mogućih poboljšanja
</commit_message>
<xml_diff>
--- a/UZOP_prezentacija.pptx
+++ b/UZOP_prezentacija.pptx
@@ -17,7 +17,8 @@
     <p:sldId id="267" r:id="rId11"/>
     <p:sldId id="262" r:id="rId12"/>
     <p:sldId id="269" r:id="rId13"/>
-    <p:sldId id="268" r:id="rId14"/>
+    <p:sldId id="270" r:id="rId14"/>
+    <p:sldId id="268" r:id="rId15"/>
   </p:sldIdLst>
   <p:sldSz cx="12192000" cy="6858000"/>
   <p:notesSz cx="6858000" cy="9144000"/>
@@ -116,6 +117,11 @@
       </a:defRPr>
     </a:lvl9pPr>
   </p:defaultTextStyle>
+  <p:extLst>
+    <p:ext uri="{EFAFB233-063F-42B5-8137-9DF3F51BA10A}">
+      <p15:sldGuideLst xmlns:p15="http://schemas.microsoft.com/office/powerpoint/2012/main"/>
+    </p:ext>
+  </p:extLst>
 </p:presentation>
 </file>
 
@@ -841,7 +847,7 @@
           <a:p>
             <a:fld id="{DA75EC26-DEF9-4E65-BF39-2B0A0E2CF47F}" type="datetimeFigureOut">
               <a:rPr lang="en-US" smtClean="0"/>
-              <a:t>1/10/2023</a:t>
+              <a:t>1/11/2023</a:t>
             </a:fld>
             <a:endParaRPr lang="en-US"/>
           </a:p>
@@ -1092,7 +1098,7 @@
           <a:p>
             <a:fld id="{DA75EC26-DEF9-4E65-BF39-2B0A0E2CF47F}" type="datetimeFigureOut">
               <a:rPr lang="en-US" smtClean="0"/>
-              <a:t>1/10/2023</a:t>
+              <a:t>1/11/2023</a:t>
             </a:fld>
             <a:endParaRPr lang="en-US"/>
           </a:p>
@@ -1406,7 +1412,7 @@
           <a:p>
             <a:fld id="{DA75EC26-DEF9-4E65-BF39-2B0A0E2CF47F}" type="datetimeFigureOut">
               <a:rPr lang="en-US" smtClean="0"/>
-              <a:t>1/10/2023</a:t>
+              <a:t>1/11/2023</a:t>
             </a:fld>
             <a:endParaRPr lang="en-US"/>
           </a:p>
@@ -1747,7 +1753,7 @@
           <a:p>
             <a:fld id="{DA75EC26-DEF9-4E65-BF39-2B0A0E2CF47F}" type="datetimeFigureOut">
               <a:rPr lang="en-US" smtClean="0"/>
-              <a:t>1/10/2023</a:t>
+              <a:t>1/11/2023</a:t>
             </a:fld>
             <a:endParaRPr lang="en-US"/>
           </a:p>
@@ -2061,7 +2067,7 @@
           <a:p>
             <a:fld id="{DA75EC26-DEF9-4E65-BF39-2B0A0E2CF47F}" type="datetimeFigureOut">
               <a:rPr lang="en-US" smtClean="0"/>
-              <a:t>1/10/2023</a:t>
+              <a:t>1/11/2023</a:t>
             </a:fld>
             <a:endParaRPr lang="en-US"/>
           </a:p>
@@ -2454,7 +2460,7 @@
           <a:p>
             <a:fld id="{DA75EC26-DEF9-4E65-BF39-2B0A0E2CF47F}" type="datetimeFigureOut">
               <a:rPr lang="en-US" smtClean="0"/>
-              <a:t>1/10/2023</a:t>
+              <a:t>1/11/2023</a:t>
             </a:fld>
             <a:endParaRPr lang="en-US"/>
           </a:p>
@@ -2624,7 +2630,7 @@
           <a:p>
             <a:fld id="{DA75EC26-DEF9-4E65-BF39-2B0A0E2CF47F}" type="datetimeFigureOut">
               <a:rPr lang="en-US" smtClean="0"/>
-              <a:t>1/10/2023</a:t>
+              <a:t>1/11/2023</a:t>
             </a:fld>
             <a:endParaRPr lang="en-US"/>
           </a:p>
@@ -2804,7 +2810,7 @@
           <a:p>
             <a:fld id="{DA75EC26-DEF9-4E65-BF39-2B0A0E2CF47F}" type="datetimeFigureOut">
               <a:rPr lang="en-US" smtClean="0"/>
-              <a:t>1/10/2023</a:t>
+              <a:t>1/11/2023</a:t>
             </a:fld>
             <a:endParaRPr lang="en-US"/>
           </a:p>
@@ -2980,7 +2986,7 @@
           <a:p>
             <a:fld id="{DA75EC26-DEF9-4E65-BF39-2B0A0E2CF47F}" type="datetimeFigureOut">
               <a:rPr lang="en-US" smtClean="0"/>
-              <a:t>1/10/2023</a:t>
+              <a:t>1/11/2023</a:t>
             </a:fld>
             <a:endParaRPr lang="en-US"/>
           </a:p>
@@ -3227,7 +3233,7 @@
           <a:p>
             <a:fld id="{DA75EC26-DEF9-4E65-BF39-2B0A0E2CF47F}" type="datetimeFigureOut">
               <a:rPr lang="en-US" smtClean="0"/>
-              <a:t>1/10/2023</a:t>
+              <a:t>1/11/2023</a:t>
             </a:fld>
             <a:endParaRPr lang="en-US"/>
           </a:p>
@@ -3459,7 +3465,7 @@
           <a:p>
             <a:fld id="{DA75EC26-DEF9-4E65-BF39-2B0A0E2CF47F}" type="datetimeFigureOut">
               <a:rPr lang="en-US" smtClean="0"/>
-              <a:t>1/10/2023</a:t>
+              <a:t>1/11/2023</a:t>
             </a:fld>
             <a:endParaRPr lang="en-US"/>
           </a:p>
@@ -3833,7 +3839,7 @@
           <a:p>
             <a:fld id="{DA75EC26-DEF9-4E65-BF39-2B0A0E2CF47F}" type="datetimeFigureOut">
               <a:rPr lang="en-US" smtClean="0"/>
-              <a:t>1/10/2023</a:t>
+              <a:t>1/11/2023</a:t>
             </a:fld>
             <a:endParaRPr lang="en-US"/>
           </a:p>
@@ -3956,7 +3962,7 @@
           <a:p>
             <a:fld id="{DA75EC26-DEF9-4E65-BF39-2B0A0E2CF47F}" type="datetimeFigureOut">
               <a:rPr lang="en-US" smtClean="0"/>
-              <a:t>1/10/2023</a:t>
+              <a:t>1/11/2023</a:t>
             </a:fld>
             <a:endParaRPr lang="en-US"/>
           </a:p>
@@ -4051,7 +4057,7 @@
           <a:p>
             <a:fld id="{DA75EC26-DEF9-4E65-BF39-2B0A0E2CF47F}" type="datetimeFigureOut">
               <a:rPr lang="en-US" smtClean="0"/>
-              <a:t>1/10/2023</a:t>
+              <a:t>1/11/2023</a:t>
             </a:fld>
             <a:endParaRPr lang="en-US"/>
           </a:p>
@@ -4306,7 +4312,7 @@
           <a:p>
             <a:fld id="{DA75EC26-DEF9-4E65-BF39-2B0A0E2CF47F}" type="datetimeFigureOut">
               <a:rPr lang="en-US" smtClean="0"/>
-              <a:t>1/10/2023</a:t>
+              <a:t>1/11/2023</a:t>
             </a:fld>
             <a:endParaRPr lang="en-US"/>
           </a:p>
@@ -4569,7 +4575,7 @@
           <a:p>
             <a:fld id="{DA75EC26-DEF9-4E65-BF39-2B0A0E2CF47F}" type="datetimeFigureOut">
               <a:rPr lang="en-US" smtClean="0"/>
-              <a:t>1/10/2023</a:t>
+              <a:t>1/11/2023</a:t>
             </a:fld>
             <a:endParaRPr lang="en-US"/>
           </a:p>
@@ -5312,7 +5318,7 @@
           <a:p>
             <a:fld id="{DA75EC26-DEF9-4E65-BF39-2B0A0E2CF47F}" type="datetimeFigureOut">
               <a:rPr lang="en-US" smtClean="0"/>
-              <a:t>1/10/2023</a:t>
+              <a:t>1/11/2023</a:t>
             </a:fld>
             <a:endParaRPr lang="en-US"/>
           </a:p>
@@ -6567,6 +6573,100 @@
           <p:cNvPr id="2" name="Title 1">
             <a:extLst>
               <a:ext uri="{FF2B5EF4-FFF2-40B4-BE49-F238E27FC236}">
+                <a16:creationId xmlns:a16="http://schemas.microsoft.com/office/drawing/2014/main" id="{BF20ECD4-FD07-23DD-D950-3FC057A46745}"/>
+              </a:ext>
+            </a:extLst>
+          </p:cNvPr>
+          <p:cNvSpPr>
+            <a:spLocks noGrp="1"/>
+          </p:cNvSpPr>
+          <p:nvPr>
+            <p:ph type="title"/>
+          </p:nvPr>
+        </p:nvSpPr>
+        <p:spPr/>
+        <p:txBody>
+          <a:bodyPr/>
+          <a:lstStyle/>
+          <a:p>
+            <a:r>
+              <a:rPr lang="hr-HR" dirty="0"/>
+              <a:t>JOŠ NEKA MOGUĆA POBOLJŠANJA</a:t>
+            </a:r>
+            <a:endParaRPr lang="en-US" dirty="0"/>
+          </a:p>
+        </p:txBody>
+      </p:sp>
+      <p:sp>
+        <p:nvSpPr>
+          <p:cNvPr id="3" name="Content Placeholder 2">
+            <a:extLst>
+              <a:ext uri="{FF2B5EF4-FFF2-40B4-BE49-F238E27FC236}">
+                <a16:creationId xmlns:a16="http://schemas.microsoft.com/office/drawing/2014/main" id="{4B47C35B-A333-B316-15A2-77FE1F5D8925}"/>
+              </a:ext>
+            </a:extLst>
+          </p:cNvPr>
+          <p:cNvSpPr>
+            <a:spLocks noGrp="1"/>
+          </p:cNvSpPr>
+          <p:nvPr>
+            <p:ph idx="1"/>
+          </p:nvPr>
+        </p:nvSpPr>
+        <p:spPr/>
+        <p:txBody>
+          <a:bodyPr/>
+          <a:lstStyle/>
+          <a:p>
+            <a:r>
+              <a:rPr lang="hr-HR" dirty="0"/>
+              <a:t>Zadržavanje samo najučestalijih riječi</a:t>
+            </a:r>
+          </a:p>
+          <a:p>
+            <a:r>
+              <a:rPr lang="hr-HR" dirty="0"/>
+              <a:t>Aproksimacija vrijednosti koju vraćaju jezgre</a:t>
+            </a:r>
+            <a:endParaRPr lang="en-US" dirty="0"/>
+          </a:p>
+        </p:txBody>
+      </p:sp>
+    </p:spTree>
+    <p:extLst>
+      <p:ext uri="{BB962C8B-B14F-4D97-AF65-F5344CB8AC3E}">
+        <p14:creationId xmlns:p14="http://schemas.microsoft.com/office/powerpoint/2010/main" val="3131552854"/>
+      </p:ext>
+    </p:extLst>
+  </p:cSld>
+  <p:clrMapOvr>
+    <a:masterClrMapping/>
+  </p:clrMapOvr>
+</p:sld>
+</file>
+
+<file path=ppt/slides/slide14.xml><?xml version="1.0" encoding="utf-8"?>
+<p:sld xmlns:a="http://schemas.openxmlformats.org/drawingml/2006/main" xmlns:r="http://schemas.openxmlformats.org/officeDocument/2006/relationships" xmlns:p="http://schemas.openxmlformats.org/presentationml/2006/main">
+  <p:cSld>
+    <p:spTree>
+      <p:nvGrpSpPr>
+        <p:cNvPr id="1" name=""/>
+        <p:cNvGrpSpPr/>
+        <p:nvPr/>
+      </p:nvGrpSpPr>
+      <p:grpSpPr>
+        <a:xfrm>
+          <a:off x="0" y="0"/>
+          <a:ext cx="0" cy="0"/>
+          <a:chOff x="0" y="0"/>
+          <a:chExt cx="0" cy="0"/>
+        </a:xfrm>
+      </p:grpSpPr>
+      <p:sp>
+        <p:nvSpPr>
+          <p:cNvPr id="2" name="Title 1">
+            <a:extLst>
+              <a:ext uri="{FF2B5EF4-FFF2-40B4-BE49-F238E27FC236}">
                 <a16:creationId xmlns:a16="http://schemas.microsoft.com/office/drawing/2014/main" id="{C1875DF9-89B9-20C6-4685-DDFD73173D78}"/>
               </a:ext>
             </a:extLst>

</xml_diff>